<commit_message>
fixed DI slide errors
</commit_message>
<xml_diff>
--- a/discussions/Week2/Week 2 Discussion Slides.pptx
+++ b/discussions/Week2/Week 2 Discussion Slides.pptx
@@ -18930,7 +18930,7 @@
             <a:tbl>
               <a:tblPr>
                 <a:noFill/>
-                <a:tableStyleId>{D8D4BB63-CA17-47BB-90D7-0EC380EFCAC3}</a:tableStyleId>
+                <a:tableStyleId>{E8295A04-D92E-42C7-BFB1-A0F87CC88F45}</a:tableStyleId>
               </a:tblPr>
               <a:tblGrid>
                 <a:gridCol w="2050700"/>
@@ -30046,7 +30046,54 @@
                 <a:cs typeface="Roboto Mono"/>
                 <a:sym typeface="Roboto Mono"/>
               </a:rPr>
-              <a:t>if (index &lt; this.elements.length) {</a:t>
+              <a:t>if (index &lt; this.elements.length </a:t>
+            </a:r>
+            <a:endParaRPr i="0" sz="1400" u="none" cap="none" strike="noStrike">
+              <a:latin typeface="Roboto Mono"/>
+              <a:ea typeface="Roboto Mono"/>
+              <a:cs typeface="Roboto Mono"/>
+              <a:sym typeface="Roboto Mono"/>
+            </a:endParaRPr>
+          </a:p>
+          <a:p>
+            <a:pPr indent="0" lvl="0" marL="914400" marR="0" rtl="0" algn="l">
+              <a:lnSpc>
+                <a:spcPct val="100000"/>
+              </a:lnSpc>
+              <a:spcBef>
+                <a:spcPts val="0"/>
+              </a:spcBef>
+              <a:spcAft>
+                <a:spcPts val="0"/>
+              </a:spcAft>
+              <a:buNone/>
+            </a:pPr>
+            <a:r>
+              <a:rPr i="0" lang="en" sz="1400" u="none" cap="none" strike="noStrike">
+                <a:latin typeface="Roboto Mono"/>
+                <a:ea typeface="Roboto Mono"/>
+                <a:cs typeface="Roboto Mono"/>
+                <a:sym typeface="Roboto Mono"/>
+              </a:rPr>
+              <a:t>&amp;&amp; index </a:t>
+            </a:r>
+            <a:r>
+              <a:rPr lang="en">
+                <a:latin typeface="Roboto Mono"/>
+                <a:ea typeface="Roboto Mono"/>
+                <a:cs typeface="Roboto Mono"/>
+                <a:sym typeface="Roboto Mono"/>
+              </a:rPr>
+              <a:t>&gt;= 0</a:t>
+            </a:r>
+            <a:r>
+              <a:rPr i="0" lang="en" sz="1400" u="none" cap="none" strike="noStrike">
+                <a:latin typeface="Roboto Mono"/>
+                <a:ea typeface="Roboto Mono"/>
+                <a:cs typeface="Roboto Mono"/>
+                <a:sym typeface="Roboto Mono"/>
+              </a:rPr>
+              <a:t>) {</a:t>
             </a:r>
             <a:endParaRPr i="0" sz="1400" u="none" cap="none" strike="noStrike">
               <a:latin typeface="Roboto Mono"/>
@@ -30929,7 +30976,49 @@
                 <a:cs typeface="Roboto Mono"/>
                 <a:sym typeface="Roboto Mono"/>
               </a:rPr>
-              <a:t>if (index &lt; this.elements.length) {</a:t>
+              <a:t>if (index &lt; this.elements.length</a:t>
+            </a:r>
+            <a:endParaRPr sz="1200">
+              <a:solidFill>
+                <a:srgbClr val="000000"/>
+              </a:solidFill>
+              <a:highlight>
+                <a:srgbClr val="FFFF00"/>
+              </a:highlight>
+              <a:latin typeface="Roboto Mono"/>
+              <a:ea typeface="Roboto Mono"/>
+              <a:cs typeface="Roboto Mono"/>
+              <a:sym typeface="Roboto Mono"/>
+            </a:endParaRPr>
+          </a:p>
+          <a:p>
+            <a:pPr indent="457200" lvl="0" marL="914400" rtl="0" algn="l">
+              <a:lnSpc>
+                <a:spcPct val="100000"/>
+              </a:lnSpc>
+              <a:spcBef>
+                <a:spcPts val="0"/>
+              </a:spcBef>
+              <a:spcAft>
+                <a:spcPts val="0"/>
+              </a:spcAft>
+              <a:buSzPts val="1800"/>
+              <a:buNone/>
+            </a:pPr>
+            <a:r>
+              <a:rPr lang="en" sz="1200">
+                <a:solidFill>
+                  <a:srgbClr val="000000"/>
+                </a:solidFill>
+                <a:highlight>
+                  <a:srgbClr val="FFFF00"/>
+                </a:highlight>
+                <a:latin typeface="Roboto Mono"/>
+                <a:ea typeface="Roboto Mono"/>
+                <a:cs typeface="Roboto Mono"/>
+                <a:sym typeface="Roboto Mono"/>
+              </a:rPr>
+              <a:t>&amp;&amp; index &gt;= 0) {</a:t>
             </a:r>
             <a:endParaRPr sz="1200">
               <a:solidFill>
@@ -32827,7 +32916,7 @@
         </p:nvSpPr>
         <p:spPr>
           <a:xfrm>
-            <a:off x="819150" y="1990725"/>
+            <a:off x="819150" y="1856950"/>
             <a:ext cx="7505700" cy="2448000"/>
           </a:xfrm>
           <a:prstGeom prst="rect">
@@ -32908,7 +32997,7 @@
                 <a:cs typeface="Roboto Mono"/>
                 <a:sym typeface="Roboto Mono"/>
               </a:rPr>
-              <a:t>    expandCapacity();</a:t>
+              <a:t>    if(this.size &gt;= this.elements.length) {</a:t>
             </a:r>
             <a:endParaRPr>
               <a:latin typeface="Roboto Mono"/>
@@ -32934,7 +33023,7 @@
                 <a:cs typeface="Roboto Mono"/>
                 <a:sym typeface="Roboto Mono"/>
               </a:rPr>
-              <a:t>    for(int i = this.size; i &gt; index; i--){</a:t>
+              <a:t>      expandCapacity();</a:t>
             </a:r>
             <a:endParaRPr>
               <a:latin typeface="Roboto Mono"/>
@@ -32960,7 +33049,7 @@
                 <a:cs typeface="Roboto Mono"/>
                 <a:sym typeface="Roboto Mono"/>
               </a:rPr>
-              <a:t>      this.elements[i] = this.elements[i - 1];</a:t>
+              <a:t>    }</a:t>
             </a:r>
             <a:endParaRPr>
               <a:latin typeface="Roboto Mono"/>
@@ -32986,7 +33075,7 @@
                 <a:cs typeface="Roboto Mono"/>
                 <a:sym typeface="Roboto Mono"/>
               </a:rPr>
-              <a:t>    }</a:t>
+              <a:t>    for(int i = this.size; i &gt; index; i--){</a:t>
             </a:r>
             <a:endParaRPr>
               <a:latin typeface="Roboto Mono"/>
@@ -33012,7 +33101,7 @@
                 <a:cs typeface="Roboto Mono"/>
                 <a:sym typeface="Roboto Mono"/>
               </a:rPr>
-              <a:t>    this.elements[index] = e; // why must this come after loop?</a:t>
+              <a:t>      this.elements[i] = this.elements[i - 1];</a:t>
             </a:r>
             <a:endParaRPr>
               <a:latin typeface="Roboto Mono"/>
@@ -33038,7 +33127,7 @@
                 <a:cs typeface="Roboto Mono"/>
                 <a:sym typeface="Roboto Mono"/>
               </a:rPr>
-              <a:t>    this.size += 1;</a:t>
+              <a:t>    }</a:t>
             </a:r>
             <a:endParaRPr>
               <a:latin typeface="Roboto Mono"/>
@@ -33064,7 +33153,7 @@
                 <a:cs typeface="Roboto Mono"/>
                 <a:sym typeface="Roboto Mono"/>
               </a:rPr>
-              <a:t>	  </a:t>
+              <a:t>    this.elements[index] = e; // why must this come after loop?</a:t>
             </a:r>
             <a:endParaRPr>
               <a:latin typeface="Roboto Mono"/>
@@ -33090,7 +33179,7 @@
                 <a:cs typeface="Roboto Mono"/>
                 <a:sym typeface="Roboto Mono"/>
               </a:rPr>
-              <a:t>    return;</a:t>
+              <a:t>    this.size += 1;</a:t>
             </a:r>
             <a:endParaRPr>
               <a:latin typeface="Roboto Mono"/>
@@ -33116,7 +33205,68 @@
                 <a:cs typeface="Roboto Mono"/>
                 <a:sym typeface="Roboto Mono"/>
               </a:rPr>
-              <a:t>  }</a:t>
+              <a:t>	  </a:t>
+            </a:r>
+            <a:endParaRPr>
+              <a:latin typeface="Roboto Mono"/>
+              <a:ea typeface="Roboto Mono"/>
+              <a:cs typeface="Roboto Mono"/>
+              <a:sym typeface="Roboto Mono"/>
+            </a:endParaRPr>
+          </a:p>
+          <a:p>
+            <a:pPr indent="0" lvl="0" marL="0" rtl="0" algn="l">
+              <a:spcBef>
+                <a:spcPts val="0"/>
+              </a:spcBef>
+              <a:spcAft>
+                <a:spcPts val="0"/>
+              </a:spcAft>
+              <a:buNone/>
+            </a:pPr>
+            <a:r>
+              <a:rPr lang="en">
+                <a:latin typeface="Roboto Mono"/>
+                <a:ea typeface="Roboto Mono"/>
+                <a:cs typeface="Roboto Mono"/>
+                <a:sym typeface="Roboto Mono"/>
+              </a:rPr>
+              <a:t>    </a:t>
+            </a:r>
+            <a:r>
+              <a:rPr lang="en">
+                <a:latin typeface="Roboto Mono"/>
+                <a:ea typeface="Roboto Mono"/>
+                <a:cs typeface="Roboto Mono"/>
+                <a:sym typeface="Roboto Mono"/>
+              </a:rPr>
+              <a:t>return;</a:t>
+            </a:r>
+            <a:endParaRPr>
+              <a:latin typeface="Roboto Mono"/>
+              <a:ea typeface="Roboto Mono"/>
+              <a:cs typeface="Roboto Mono"/>
+              <a:sym typeface="Roboto Mono"/>
+            </a:endParaRPr>
+          </a:p>
+          <a:p>
+            <a:pPr indent="0" lvl="0" marL="0" rtl="0" algn="l">
+              <a:spcBef>
+                <a:spcPts val="0"/>
+              </a:spcBef>
+              <a:spcAft>
+                <a:spcPts val="0"/>
+              </a:spcAft>
+              <a:buNone/>
+            </a:pPr>
+            <a:r>
+              <a:rPr lang="en">
+                <a:latin typeface="Roboto Mono"/>
+                <a:ea typeface="Roboto Mono"/>
+                <a:cs typeface="Roboto Mono"/>
+                <a:sym typeface="Roboto Mono"/>
+              </a:rPr>
+              <a:t>}</a:t>
             </a:r>
             <a:endParaRPr>
               <a:latin typeface="Roboto Mono"/>

</xml_diff>